<commit_message>
Fixed genes and wrote 'removeGene'
Fixed model gene names to 'mmp####' and removed 'fig' and 'Unknown'
genes.  Wrote 'removeGene'
</commit_message>
<xml_diff>
--- a/Collaborator Meetings/2014_05_08 meeting.pptx
+++ b/Collaborator Meetings/2014_05_08 meeting.pptx
@@ -201,7 +201,7 @@
           <a:p>
             <a:fld id="{1455E86B-A5C1-45AB-9431-76E750A11E91}" type="datetimeFigureOut">
               <a:rPr lang="en-US" smtClean="0"/>
-              <a:t>5/7/2014</a:t>
+              <a:t>5/8/2014</a:t>
             </a:fld>
             <a:endParaRPr lang="en-US"/>
           </a:p>
@@ -651,7 +651,7 @@
             <a:fld id="{1D8BD707-D9CF-40AE-B4C6-C98DA3205C09}" type="datetimeFigureOut">
               <a:rPr lang="en-US" smtClean="0"/>
               <a:pPr/>
-              <a:t>5/7/2014</a:t>
+              <a:t>5/8/2014</a:t>
             </a:fld>
             <a:endParaRPr lang="en-US"/>
           </a:p>
@@ -818,7 +818,7 @@
             <a:fld id="{1D8BD707-D9CF-40AE-B4C6-C98DA3205C09}" type="datetimeFigureOut">
               <a:rPr lang="en-US" smtClean="0"/>
               <a:pPr/>
-              <a:t>5/7/2014</a:t>
+              <a:t>5/8/2014</a:t>
             </a:fld>
             <a:endParaRPr lang="en-US"/>
           </a:p>
@@ -995,7 +995,7 @@
             <a:fld id="{1D8BD707-D9CF-40AE-B4C6-C98DA3205C09}" type="datetimeFigureOut">
               <a:rPr lang="en-US" smtClean="0"/>
               <a:pPr/>
-              <a:t>5/7/2014</a:t>
+              <a:t>5/8/2014</a:t>
             </a:fld>
             <a:endParaRPr lang="en-US"/>
           </a:p>
@@ -1162,7 +1162,7 @@
             <a:fld id="{1D8BD707-D9CF-40AE-B4C6-C98DA3205C09}" type="datetimeFigureOut">
               <a:rPr lang="en-US" smtClean="0"/>
               <a:pPr/>
-              <a:t>5/7/2014</a:t>
+              <a:t>5/8/2014</a:t>
             </a:fld>
             <a:endParaRPr lang="en-US"/>
           </a:p>
@@ -1405,7 +1405,7 @@
             <a:fld id="{1D8BD707-D9CF-40AE-B4C6-C98DA3205C09}" type="datetimeFigureOut">
               <a:rPr lang="en-US" smtClean="0"/>
               <a:pPr/>
-              <a:t>5/7/2014</a:t>
+              <a:t>5/8/2014</a:t>
             </a:fld>
             <a:endParaRPr lang="en-US"/>
           </a:p>
@@ -1690,7 +1690,7 @@
             <a:fld id="{1D8BD707-D9CF-40AE-B4C6-C98DA3205C09}" type="datetimeFigureOut">
               <a:rPr lang="en-US" smtClean="0"/>
               <a:pPr/>
-              <a:t>5/7/2014</a:t>
+              <a:t>5/8/2014</a:t>
             </a:fld>
             <a:endParaRPr lang="en-US"/>
           </a:p>
@@ -2109,7 +2109,7 @@
             <a:fld id="{1D8BD707-D9CF-40AE-B4C6-C98DA3205C09}" type="datetimeFigureOut">
               <a:rPr lang="en-US" smtClean="0"/>
               <a:pPr/>
-              <a:t>5/7/2014</a:t>
+              <a:t>5/8/2014</a:t>
             </a:fld>
             <a:endParaRPr lang="en-US"/>
           </a:p>
@@ -2224,7 +2224,7 @@
             <a:fld id="{1D8BD707-D9CF-40AE-B4C6-C98DA3205C09}" type="datetimeFigureOut">
               <a:rPr lang="en-US" smtClean="0"/>
               <a:pPr/>
-              <a:t>5/7/2014</a:t>
+              <a:t>5/8/2014</a:t>
             </a:fld>
             <a:endParaRPr lang="en-US"/>
           </a:p>
@@ -2316,7 +2316,7 @@
             <a:fld id="{1D8BD707-D9CF-40AE-B4C6-C98DA3205C09}" type="datetimeFigureOut">
               <a:rPr lang="en-US" smtClean="0"/>
               <a:pPr/>
-              <a:t>5/7/2014</a:t>
+              <a:t>5/8/2014</a:t>
             </a:fld>
             <a:endParaRPr lang="en-US"/>
           </a:p>
@@ -2590,7 +2590,7 @@
             <a:fld id="{1D8BD707-D9CF-40AE-B4C6-C98DA3205C09}" type="datetimeFigureOut">
               <a:rPr lang="en-US" smtClean="0"/>
               <a:pPr/>
-              <a:t>5/7/2014</a:t>
+              <a:t>5/8/2014</a:t>
             </a:fld>
             <a:endParaRPr lang="en-US"/>
           </a:p>
@@ -2840,7 +2840,7 @@
             <a:fld id="{1D8BD707-D9CF-40AE-B4C6-C98DA3205C09}" type="datetimeFigureOut">
               <a:rPr lang="en-US" smtClean="0"/>
               <a:pPr/>
-              <a:t>5/7/2014</a:t>
+              <a:t>5/8/2014</a:t>
             </a:fld>
             <a:endParaRPr lang="en-US"/>
           </a:p>
@@ -3050,7 +3050,7 @@
             <a:fld id="{1D8BD707-D9CF-40AE-B4C6-C98DA3205C09}" type="datetimeFigureOut">
               <a:rPr lang="en-US" smtClean="0"/>
               <a:pPr/>
-              <a:t>5/7/2014</a:t>
+              <a:t>5/8/2014</a:t>
             </a:fld>
             <a:endParaRPr lang="en-US"/>
           </a:p>
@@ -3437,12 +3437,8 @@
           <a:lstStyle/>
           <a:p>
             <a:r>
-              <a:rPr lang="en-US" dirty="0" err="1" smtClean="0"/>
-              <a:t>Initiatial</a:t>
-            </a:r>
-            <a:r>
               <a:rPr lang="en-US" dirty="0" smtClean="0"/>
-              <a:t> </a:t>
+              <a:t>Initial </a:t>
             </a:r>
             <a:r>
               <a:rPr lang="en-US" dirty="0" err="1" smtClean="0"/>
@@ -4737,7 +4733,6 @@
                   <a:rPr lang="en-US" dirty="0"/>
                   <a:t>B</a:t>
                 </a:r>
-                <a:endParaRPr lang="en-US" dirty="0"/>
               </a:p>
             </p:txBody>
           </p:sp>
@@ -4781,7 +4776,6 @@
                   <a:rPr lang="en-US" dirty="0"/>
                   <a:t>C</a:t>
                 </a:r>
-                <a:endParaRPr lang="en-US" dirty="0"/>
               </a:p>
             </p:txBody>
           </p:sp>
@@ -4970,11 +4964,6 @@
                   </a:rPr>
                   <a:t>x</a:t>
                 </a:r>
-                <a:endParaRPr lang="en-US" sz="6000" b="1" dirty="0">
-                  <a:solidFill>
-                    <a:srgbClr val="FF0000"/>
-                  </a:solidFill>
-                </a:endParaRPr>
               </a:p>
             </p:txBody>
           </p:sp>
@@ -5201,7 +5190,6 @@
                   <a:rPr lang="en-US" dirty="0"/>
                   <a:t>B</a:t>
                 </a:r>
-                <a:endParaRPr lang="en-US" dirty="0"/>
               </a:p>
             </p:txBody>
           </p:sp>
@@ -5245,7 +5233,6 @@
                   <a:rPr lang="en-US" dirty="0"/>
                   <a:t>C</a:t>
                 </a:r>
-                <a:endParaRPr lang="en-US" dirty="0"/>
               </a:p>
             </p:txBody>
           </p:sp>
@@ -5434,11 +5421,6 @@
                   </a:rPr>
                   <a:t>x</a:t>
                 </a:r>
-                <a:endParaRPr lang="en-US" sz="6000" b="1" dirty="0">
-                  <a:solidFill>
-                    <a:srgbClr val="FF0000"/>
-                  </a:solidFill>
-                </a:endParaRPr>
               </a:p>
             </p:txBody>
           </p:sp>
@@ -5474,11 +5456,6 @@
               </a:rPr>
               <a:t>x</a:t>
             </a:r>
-            <a:endParaRPr lang="en-US" sz="6000" b="1" dirty="0">
-              <a:solidFill>
-                <a:srgbClr val="FF0000"/>
-              </a:solidFill>
-            </a:endParaRPr>
           </a:p>
         </p:txBody>
       </p:sp>

</xml_diff>